<commit_message>
Fixed bug and corrected house layout
</commit_message>
<xml_diff>
--- a/House_Layout_PPT.pptx
+++ b/House_Layout_PPT.pptx
@@ -310,6 +310,11 @@
       </a:defRPr>
     </a:lvl9pPr>
   </p:defaultTextStyle>
+  <p:extLst>
+    <p:ext uri="{EFAFB233-063F-42B5-8137-9DF3F51BA10A}">
+      <p15:sldGuideLst xmlns:p15="http://schemas.microsoft.com/office/powerpoint/2012/main"/>
+    </p:ext>
+  </p:extLst>
 </p:presentation>
 </file>
 
@@ -2725,7 +2730,7 @@
           </a:ln>
           <a:extLst>
             <a:ext uri="{C572A759-6A51-4108-AA02-DFA0A04FC94B}">
-              <ma14:wrappingTextBoxFlag xmlns:ma14="http://schemas.microsoft.com/office/mac/drawingml/2011/main" xmlns:a14="http://schemas.microsoft.com/office/drawing/2010/main" xmlns:m="http://schemas.openxmlformats.org/officeDocument/2006/math" xmlns="" val="1"/>
+              <ma14:wrappingTextBoxFlag xmlns="" xmlns:m="http://schemas.openxmlformats.org/officeDocument/2006/math" xmlns:a14="http://schemas.microsoft.com/office/drawing/2010/main" xmlns:ma14="http://schemas.microsoft.com/office/mac/drawingml/2011/main" val="1"/>
             </a:ext>
           </a:extLst>
         </p:spPr>
@@ -2764,7 +2769,7 @@
           </a:ln>
           <a:extLst>
             <a:ext uri="{C572A759-6A51-4108-AA02-DFA0A04FC94B}">
-              <ma14:wrappingTextBoxFlag xmlns:ma14="http://schemas.microsoft.com/office/mac/drawingml/2011/main" xmlns:a14="http://schemas.microsoft.com/office/drawing/2010/main" xmlns:m="http://schemas.openxmlformats.org/officeDocument/2006/math" xmlns="" val="1"/>
+              <ma14:wrappingTextBoxFlag xmlns="" xmlns:m="http://schemas.openxmlformats.org/officeDocument/2006/math" xmlns:a14="http://schemas.microsoft.com/office/drawing/2010/main" xmlns:ma14="http://schemas.microsoft.com/office/mac/drawingml/2011/main" val="1"/>
             </a:ext>
           </a:extLst>
         </p:spPr>
@@ -3611,7 +3616,7 @@
           </a:ln>
           <a:extLst>
             <a:ext uri="{C572A759-6A51-4108-AA02-DFA0A04FC94B}">
-              <ma14:wrappingTextBoxFlag xmlns:ma14="http://schemas.microsoft.com/office/mac/drawingml/2011/main" xmlns:a14="http://schemas.microsoft.com/office/drawing/2010/main" xmlns:m="http://schemas.openxmlformats.org/officeDocument/2006/math" xmlns="" val="1"/>
+              <ma14:wrappingTextBoxFlag xmlns="" xmlns:m="http://schemas.openxmlformats.org/officeDocument/2006/math" xmlns:a14="http://schemas.microsoft.com/office/drawing/2010/main" xmlns:ma14="http://schemas.microsoft.com/office/mac/drawingml/2011/main" val="1"/>
             </a:ext>
           </a:extLst>
         </p:spPr>
@@ -3659,7 +3664,7 @@
           </a:ln>
           <a:extLst>
             <a:ext uri="{C572A759-6A51-4108-AA02-DFA0A04FC94B}">
-              <ma14:wrappingTextBoxFlag xmlns:ma14="http://schemas.microsoft.com/office/mac/drawingml/2011/main" xmlns:a14="http://schemas.microsoft.com/office/drawing/2010/main" xmlns:m="http://schemas.openxmlformats.org/officeDocument/2006/math" xmlns="" val="1"/>
+              <ma14:wrappingTextBoxFlag xmlns="" xmlns:m="http://schemas.openxmlformats.org/officeDocument/2006/math" xmlns:a14="http://schemas.microsoft.com/office/drawing/2010/main" xmlns:ma14="http://schemas.microsoft.com/office/mac/drawingml/2011/main" val="1"/>
             </a:ext>
           </a:extLst>
         </p:spPr>
@@ -3707,7 +3712,7 @@
           </a:ln>
           <a:extLst>
             <a:ext uri="{C572A759-6A51-4108-AA02-DFA0A04FC94B}">
-              <ma14:wrappingTextBoxFlag xmlns:ma14="http://schemas.microsoft.com/office/mac/drawingml/2011/main" xmlns:a14="http://schemas.microsoft.com/office/drawing/2010/main" xmlns:m="http://schemas.openxmlformats.org/officeDocument/2006/math" xmlns="" val="1"/>
+              <ma14:wrappingTextBoxFlag xmlns="" xmlns:m="http://schemas.openxmlformats.org/officeDocument/2006/math" xmlns:a14="http://schemas.microsoft.com/office/drawing/2010/main" xmlns:ma14="http://schemas.microsoft.com/office/mac/drawingml/2011/main" val="1"/>
             </a:ext>
           </a:extLst>
         </p:spPr>
@@ -3755,7 +3760,7 @@
           </a:ln>
           <a:extLst>
             <a:ext uri="{C572A759-6A51-4108-AA02-DFA0A04FC94B}">
-              <ma14:wrappingTextBoxFlag xmlns:ma14="http://schemas.microsoft.com/office/mac/drawingml/2011/main" xmlns:a14="http://schemas.microsoft.com/office/drawing/2010/main" xmlns:m="http://schemas.openxmlformats.org/officeDocument/2006/math" xmlns="" val="1"/>
+              <ma14:wrappingTextBoxFlag xmlns="" xmlns:m="http://schemas.openxmlformats.org/officeDocument/2006/math" xmlns:a14="http://schemas.microsoft.com/office/drawing/2010/main" xmlns:ma14="http://schemas.microsoft.com/office/mac/drawingml/2011/main" val="1"/>
             </a:ext>
           </a:extLst>
         </p:spPr>
@@ -3803,7 +3808,7 @@
           </a:ln>
           <a:extLst>
             <a:ext uri="{C572A759-6A51-4108-AA02-DFA0A04FC94B}">
-              <ma14:wrappingTextBoxFlag xmlns:ma14="http://schemas.microsoft.com/office/mac/drawingml/2011/main" xmlns:a14="http://schemas.microsoft.com/office/drawing/2010/main" xmlns:m="http://schemas.openxmlformats.org/officeDocument/2006/math" xmlns="" val="1"/>
+              <ma14:wrappingTextBoxFlag xmlns="" xmlns:m="http://schemas.openxmlformats.org/officeDocument/2006/math" xmlns:a14="http://schemas.microsoft.com/office/drawing/2010/main" xmlns:ma14="http://schemas.microsoft.com/office/mac/drawingml/2011/main" val="1"/>
             </a:ext>
           </a:extLst>
         </p:spPr>
@@ -3851,7 +3856,7 @@
           </a:ln>
           <a:extLst>
             <a:ext uri="{C572A759-6A51-4108-AA02-DFA0A04FC94B}">
-              <ma14:wrappingTextBoxFlag xmlns:ma14="http://schemas.microsoft.com/office/mac/drawingml/2011/main" xmlns:a14="http://schemas.microsoft.com/office/drawing/2010/main" xmlns:m="http://schemas.openxmlformats.org/officeDocument/2006/math" xmlns="" val="1"/>
+              <ma14:wrappingTextBoxFlag xmlns="" xmlns:m="http://schemas.openxmlformats.org/officeDocument/2006/math" xmlns:a14="http://schemas.microsoft.com/office/drawing/2010/main" xmlns:ma14="http://schemas.microsoft.com/office/mac/drawingml/2011/main" val="1"/>
             </a:ext>
           </a:extLst>
         </p:spPr>
@@ -3908,7 +3913,7 @@
           </a:ln>
           <a:extLst>
             <a:ext uri="{C572A759-6A51-4108-AA02-DFA0A04FC94B}">
-              <ma14:wrappingTextBoxFlag xmlns:ma14="http://schemas.microsoft.com/office/mac/drawingml/2011/main" xmlns:a14="http://schemas.microsoft.com/office/drawing/2010/main" xmlns:m="http://schemas.openxmlformats.org/officeDocument/2006/math" xmlns="" val="1"/>
+              <ma14:wrappingTextBoxFlag xmlns="" xmlns:m="http://schemas.openxmlformats.org/officeDocument/2006/math" xmlns:a14="http://schemas.microsoft.com/office/drawing/2010/main" xmlns:ma14="http://schemas.microsoft.com/office/mac/drawingml/2011/main" val="1"/>
             </a:ext>
           </a:extLst>
         </p:spPr>
@@ -3956,7 +3961,7 @@
           </a:ln>
           <a:extLst>
             <a:ext uri="{C572A759-6A51-4108-AA02-DFA0A04FC94B}">
-              <ma14:wrappingTextBoxFlag xmlns:ma14="http://schemas.microsoft.com/office/mac/drawingml/2011/main" xmlns:a14="http://schemas.microsoft.com/office/drawing/2010/main" xmlns:m="http://schemas.openxmlformats.org/officeDocument/2006/math" xmlns="" val="1"/>
+              <ma14:wrappingTextBoxFlag xmlns="" xmlns:m="http://schemas.openxmlformats.org/officeDocument/2006/math" xmlns:a14="http://schemas.microsoft.com/office/drawing/2010/main" xmlns:ma14="http://schemas.microsoft.com/office/mac/drawingml/2011/main" val="1"/>
             </a:ext>
           </a:extLst>
         </p:spPr>
@@ -4004,7 +4009,7 @@
           </a:ln>
           <a:extLst>
             <a:ext uri="{C572A759-6A51-4108-AA02-DFA0A04FC94B}">
-              <ma14:wrappingTextBoxFlag xmlns:ma14="http://schemas.microsoft.com/office/mac/drawingml/2011/main" xmlns:a14="http://schemas.microsoft.com/office/drawing/2010/main" xmlns:m="http://schemas.openxmlformats.org/officeDocument/2006/math" xmlns="" val="1"/>
+              <ma14:wrappingTextBoxFlag xmlns="" xmlns:m="http://schemas.openxmlformats.org/officeDocument/2006/math" xmlns:a14="http://schemas.microsoft.com/office/drawing/2010/main" xmlns:ma14="http://schemas.microsoft.com/office/mac/drawingml/2011/main" val="1"/>
             </a:ext>
           </a:extLst>
         </p:spPr>
@@ -4053,7 +4058,7 @@
           </a:ln>
           <a:extLst>
             <a:ext uri="{C572A759-6A51-4108-AA02-DFA0A04FC94B}">
-              <ma14:wrappingTextBoxFlag xmlns:ma14="http://schemas.microsoft.com/office/mac/drawingml/2011/main" xmlns:a14="http://schemas.microsoft.com/office/drawing/2010/main" xmlns:m="http://schemas.openxmlformats.org/officeDocument/2006/math" xmlns="" val="1"/>
+              <ma14:wrappingTextBoxFlag xmlns="" xmlns:m="http://schemas.openxmlformats.org/officeDocument/2006/math" xmlns:a14="http://schemas.microsoft.com/office/drawing/2010/main" xmlns:ma14="http://schemas.microsoft.com/office/mac/drawingml/2011/main" val="1"/>
             </a:ext>
           </a:extLst>
         </p:spPr>
@@ -4178,7 +4183,7 @@
           </a:ln>
           <a:extLst>
             <a:ext uri="{C572A759-6A51-4108-AA02-DFA0A04FC94B}">
-              <ma14:wrappingTextBoxFlag xmlns:ma14="http://schemas.microsoft.com/office/mac/drawingml/2011/main" xmlns:a14="http://schemas.microsoft.com/office/drawing/2010/main" xmlns:m="http://schemas.openxmlformats.org/officeDocument/2006/math" xmlns="" val="1"/>
+              <ma14:wrappingTextBoxFlag xmlns="" xmlns:m="http://schemas.openxmlformats.org/officeDocument/2006/math" xmlns:a14="http://schemas.microsoft.com/office/drawing/2010/main" xmlns:ma14="http://schemas.microsoft.com/office/mac/drawingml/2011/main" val="1"/>
             </a:ext>
           </a:extLst>
         </p:spPr>
@@ -4202,606 +4207,6 @@
               <a:rPr dirty="0"/>
               <a:t>Yard</a:t>
             </a:r>
-          </a:p>
-        </p:txBody>
-      </p:sp>
-      <p:sp>
-        <p:nvSpPr>
-          <p:cNvPr id="7" name="Ellipse 6">
-            <a:extLst>
-              <a:ext uri="{FF2B5EF4-FFF2-40B4-BE49-F238E27FC236}">
-                <a16:creationId xmlns:a16="http://schemas.microsoft.com/office/drawing/2014/main" id="{66E28ACE-D53B-44CC-85B8-F74E1FA6B4A0}"/>
-              </a:ext>
-            </a:extLst>
-          </p:cNvPr>
-          <p:cNvSpPr/>
-          <p:nvPr/>
-        </p:nvSpPr>
-        <p:spPr>
-          <a:xfrm>
-            <a:off x="5551428" y="4257612"/>
-            <a:ext cx="1080000" cy="1080000"/>
-          </a:xfrm>
-          <a:prstGeom prst="ellipse">
-            <a:avLst/>
-          </a:prstGeom>
-          <a:solidFill>
-            <a:schemeClr val="accent5"/>
-          </a:solidFill>
-          <a:ln w="12700" cap="flat">
-            <a:noFill/>
-            <a:miter lim="400000"/>
-          </a:ln>
-          <a:effectLst/>
-          <a:sp3d/>
-        </p:spPr>
-        <p:style>
-          <a:lnRef idx="0">
-            <a:scrgbClr r="0" g="0" b="0"/>
-          </a:lnRef>
-          <a:fillRef idx="0">
-            <a:scrgbClr r="0" g="0" b="0"/>
-          </a:fillRef>
-          <a:effectRef idx="0">
-            <a:scrgbClr r="0" g="0" b="0"/>
-          </a:effectRef>
-          <a:fontRef idx="none"/>
-        </p:style>
-        <p:txBody>
-          <a:bodyPr rot="0" spcFirstLastPara="1" vertOverflow="overflow" horzOverflow="overflow" vert="horz" wrap="square" lIns="50800" tIns="50800" rIns="50800" bIns="50800" numCol="1" spcCol="38100" rtlCol="0" anchor="ctr">
-            <a:spAutoFit/>
-          </a:bodyPr>
-          <a:lstStyle/>
-          <a:p>
-            <a:pPr marL="0" marR="0" indent="0" algn="ctr" defTabSz="825500" rtl="0" fontAlgn="auto" latinLnBrk="0" hangingPunct="0">
-              <a:lnSpc>
-                <a:spcPct val="100000"/>
-              </a:lnSpc>
-              <a:spcBef>
-                <a:spcPts val="0"/>
-              </a:spcBef>
-              <a:spcAft>
-                <a:spcPts val="0"/>
-              </a:spcAft>
-              <a:buClrTx/>
-              <a:buSzTx/>
-              <a:buFontTx/>
-              <a:buNone/>
-              <a:tabLst/>
-            </a:pPr>
-            <a:endParaRPr kumimoji="0" lang="en-DE" sz="3200" b="0" i="0" u="none" strike="noStrike" cap="none" spc="0" normalizeH="0" baseline="0" dirty="0">
-              <a:ln>
-                <a:noFill/>
-              </a:ln>
-              <a:solidFill>
-                <a:srgbClr val="FFFFFF"/>
-              </a:solidFill>
-              <a:effectLst/>
-              <a:uFillTx/>
-              <a:latin typeface="Helvetica Neue Medium"/>
-              <a:ea typeface="Helvetica Neue Medium"/>
-              <a:cs typeface="Helvetica Neue Medium"/>
-              <a:sym typeface="Helvetica Neue Medium"/>
-            </a:endParaRPr>
-          </a:p>
-        </p:txBody>
-      </p:sp>
-      <p:sp>
-        <p:nvSpPr>
-          <p:cNvPr id="8" name="Ellipse 7">
-            <a:extLst>
-              <a:ext uri="{FF2B5EF4-FFF2-40B4-BE49-F238E27FC236}">
-                <a16:creationId xmlns:a16="http://schemas.microsoft.com/office/drawing/2014/main" id="{ADA53257-D038-49C7-9CEB-BBD3E9B17F85}"/>
-              </a:ext>
-            </a:extLst>
-          </p:cNvPr>
-          <p:cNvSpPr/>
-          <p:nvPr/>
-        </p:nvSpPr>
-        <p:spPr>
-          <a:xfrm>
-            <a:off x="6806039" y="4257612"/>
-            <a:ext cx="1058400" cy="1058400"/>
-          </a:xfrm>
-          <a:prstGeom prst="ellipse">
-            <a:avLst/>
-          </a:prstGeom>
-          <a:solidFill>
-            <a:schemeClr val="accent1">
-              <a:lumMod val="60000"/>
-              <a:lumOff val="40000"/>
-            </a:schemeClr>
-          </a:solidFill>
-          <a:ln w="12700" cap="flat">
-            <a:noFill/>
-            <a:miter lim="400000"/>
-          </a:ln>
-          <a:effectLst/>
-          <a:sp3d/>
-        </p:spPr>
-        <p:style>
-          <a:lnRef idx="0">
-            <a:scrgbClr r="0" g="0" b="0"/>
-          </a:lnRef>
-          <a:fillRef idx="0">
-            <a:scrgbClr r="0" g="0" b="0"/>
-          </a:fillRef>
-          <a:effectRef idx="0">
-            <a:scrgbClr r="0" g="0" b="0"/>
-          </a:effectRef>
-          <a:fontRef idx="none"/>
-        </p:style>
-        <p:txBody>
-          <a:bodyPr rot="0" spcFirstLastPara="1" vertOverflow="overflow" horzOverflow="overflow" vert="horz" wrap="square" lIns="50800" tIns="50800" rIns="50800" bIns="50800" numCol="1" spcCol="38100" rtlCol="0" anchor="ctr">
-            <a:spAutoFit/>
-          </a:bodyPr>
-          <a:lstStyle/>
-          <a:p>
-            <a:pPr marL="0" marR="0" indent="0" algn="ctr" defTabSz="825500" rtl="0" fontAlgn="auto" latinLnBrk="0" hangingPunct="0">
-              <a:lnSpc>
-                <a:spcPct val="100000"/>
-              </a:lnSpc>
-              <a:spcBef>
-                <a:spcPts val="0"/>
-              </a:spcBef>
-              <a:spcAft>
-                <a:spcPts val="0"/>
-              </a:spcAft>
-              <a:buClrTx/>
-              <a:buSzTx/>
-              <a:buFontTx/>
-              <a:buNone/>
-              <a:tabLst/>
-            </a:pPr>
-            <a:endParaRPr kumimoji="0" lang="en-DE" sz="3200" b="0" i="0" u="none" strike="noStrike" cap="none" spc="0" normalizeH="0" baseline="0">
-              <a:ln>
-                <a:noFill/>
-              </a:ln>
-              <a:solidFill>
-                <a:srgbClr val="FFFFFF"/>
-              </a:solidFill>
-              <a:effectLst/>
-              <a:uFillTx/>
-              <a:latin typeface="Helvetica Neue Medium"/>
-              <a:ea typeface="Helvetica Neue Medium"/>
-              <a:cs typeface="Helvetica Neue Medium"/>
-              <a:sym typeface="Helvetica Neue Medium"/>
-            </a:endParaRPr>
-          </a:p>
-        </p:txBody>
-      </p:sp>
-      <p:sp>
-        <p:nvSpPr>
-          <p:cNvPr id="9" name="Ellipse 8">
-            <a:extLst>
-              <a:ext uri="{FF2B5EF4-FFF2-40B4-BE49-F238E27FC236}">
-                <a16:creationId xmlns:a16="http://schemas.microsoft.com/office/drawing/2014/main" id="{0676A61C-F02A-4262-9203-5AED5E5514A5}"/>
-              </a:ext>
-            </a:extLst>
-          </p:cNvPr>
-          <p:cNvSpPr/>
-          <p:nvPr/>
-        </p:nvSpPr>
-        <p:spPr>
-          <a:xfrm>
-            <a:off x="8039050" y="4326012"/>
-            <a:ext cx="943200" cy="943200"/>
-          </a:xfrm>
-          <a:prstGeom prst="ellipse">
-            <a:avLst/>
-          </a:prstGeom>
-          <a:solidFill>
-            <a:srgbClr val="7030A0"/>
-          </a:solidFill>
-          <a:ln w="12700" cap="flat">
-            <a:noFill/>
-            <a:miter lim="400000"/>
-          </a:ln>
-          <a:effectLst/>
-          <a:sp3d/>
-        </p:spPr>
-        <p:style>
-          <a:lnRef idx="0">
-            <a:scrgbClr r="0" g="0" b="0"/>
-          </a:lnRef>
-          <a:fillRef idx="0">
-            <a:scrgbClr r="0" g="0" b="0"/>
-          </a:fillRef>
-          <a:effectRef idx="0">
-            <a:scrgbClr r="0" g="0" b="0"/>
-          </a:effectRef>
-          <a:fontRef idx="none"/>
-        </p:style>
-        <p:txBody>
-          <a:bodyPr rot="0" spcFirstLastPara="1" vertOverflow="overflow" horzOverflow="overflow" vert="horz" wrap="square" lIns="50800" tIns="50800" rIns="50800" bIns="50800" numCol="1" spcCol="38100" rtlCol="0" anchor="ctr">
-            <a:spAutoFit/>
-          </a:bodyPr>
-          <a:lstStyle/>
-          <a:p>
-            <a:pPr marL="0" marR="0" indent="0" algn="ctr" defTabSz="825500" rtl="0" fontAlgn="auto" latinLnBrk="0" hangingPunct="0">
-              <a:lnSpc>
-                <a:spcPct val="100000"/>
-              </a:lnSpc>
-              <a:spcBef>
-                <a:spcPts val="0"/>
-              </a:spcBef>
-              <a:spcAft>
-                <a:spcPts val="0"/>
-              </a:spcAft>
-              <a:buClrTx/>
-              <a:buSzTx/>
-              <a:buFontTx/>
-              <a:buNone/>
-              <a:tabLst/>
-            </a:pPr>
-            <a:endParaRPr kumimoji="0" lang="en-DE" sz="3200" b="0" i="0" u="none" strike="noStrike" cap="none" spc="0" normalizeH="0" baseline="0">
-              <a:ln>
-                <a:noFill/>
-              </a:ln>
-              <a:solidFill>
-                <a:srgbClr val="FFFFFF"/>
-              </a:solidFill>
-              <a:effectLst/>
-              <a:uFillTx/>
-              <a:latin typeface="Helvetica Neue Medium"/>
-              <a:ea typeface="Helvetica Neue Medium"/>
-              <a:cs typeface="Helvetica Neue Medium"/>
-              <a:sym typeface="Helvetica Neue Medium"/>
-            </a:endParaRPr>
-          </a:p>
-        </p:txBody>
-      </p:sp>
-      <p:sp>
-        <p:nvSpPr>
-          <p:cNvPr id="10" name="Textfeld 9">
-            <a:extLst>
-              <a:ext uri="{FF2B5EF4-FFF2-40B4-BE49-F238E27FC236}">
-                <a16:creationId xmlns:a16="http://schemas.microsoft.com/office/drawing/2014/main" id="{7F87F1C4-F699-4A1A-A8C5-165F4DEA0623}"/>
-              </a:ext>
-            </a:extLst>
-          </p:cNvPr>
-          <p:cNvSpPr txBox="1"/>
-          <p:nvPr/>
-        </p:nvSpPr>
-        <p:spPr>
-          <a:xfrm>
-            <a:off x="5411755" y="3358777"/>
-            <a:ext cx="1219673" cy="841256"/>
-          </a:xfrm>
-          <a:prstGeom prst="rect">
-            <a:avLst/>
-          </a:prstGeom>
-          <a:noFill/>
-          <a:ln w="12700" cap="flat">
-            <a:noFill/>
-            <a:miter lim="400000"/>
-          </a:ln>
-          <a:effectLst/>
-          <a:sp3d/>
-        </p:spPr>
-        <p:style>
-          <a:lnRef idx="0">
-            <a:scrgbClr r="0" g="0" b="0"/>
-          </a:lnRef>
-          <a:fillRef idx="0">
-            <a:scrgbClr r="0" g="0" b="0"/>
-          </a:fillRef>
-          <a:effectRef idx="0">
-            <a:scrgbClr r="0" g="0" b="0"/>
-          </a:effectRef>
-          <a:fontRef idx="none"/>
-        </p:style>
-        <p:txBody>
-          <a:bodyPr rot="0" spcFirstLastPara="1" vertOverflow="overflow" horzOverflow="overflow" vert="horz" wrap="square" lIns="50800" tIns="50800" rIns="50800" bIns="50800" numCol="1" spcCol="38100" rtlCol="0" anchor="ctr">
-            <a:spAutoFit/>
-          </a:bodyPr>
-          <a:lstStyle/>
-          <a:p>
-            <a:pPr marL="0" marR="0" indent="0" algn="ctr" defTabSz="2438338" rtl="0" fontAlgn="auto" latinLnBrk="0" hangingPunct="0">
-              <a:lnSpc>
-                <a:spcPct val="100000"/>
-              </a:lnSpc>
-              <a:spcBef>
-                <a:spcPts val="0"/>
-              </a:spcBef>
-              <a:spcAft>
-                <a:spcPts val="0"/>
-              </a:spcAft>
-              <a:buClrTx/>
-              <a:buSzTx/>
-              <a:buFontTx/>
-              <a:buNone/>
-              <a:tabLst/>
-            </a:pPr>
-            <a:r>
-              <a:rPr kumimoji="0" lang="en-US" sz="2400" b="0" i="0" u="none" strike="noStrike" cap="none" spc="0" normalizeH="0" baseline="0" dirty="0">
-                <a:ln>
-                  <a:noFill/>
-                </a:ln>
-                <a:solidFill>
-                  <a:srgbClr val="5E5E5E"/>
-                </a:solidFill>
-                <a:effectLst/>
-                <a:uFillTx/>
-                <a:latin typeface="+mn-lt"/>
-                <a:ea typeface="+mn-ea"/>
-                <a:cs typeface="+mn-cs"/>
-                <a:sym typeface="Helvetica Neue"/>
-              </a:rPr>
-              <a:t>DACH</a:t>
-            </a:r>
-          </a:p>
-          <a:p>
-            <a:pPr marL="0" marR="0" indent="0" algn="ctr" defTabSz="2438338" rtl="0" fontAlgn="auto" latinLnBrk="0" hangingPunct="0">
-              <a:lnSpc>
-                <a:spcPct val="100000"/>
-              </a:lnSpc>
-              <a:spcBef>
-                <a:spcPts val="0"/>
-              </a:spcBef>
-              <a:spcAft>
-                <a:spcPts val="0"/>
-              </a:spcAft>
-              <a:buClrTx/>
-              <a:buSzTx/>
-              <a:buFontTx/>
-              <a:buNone/>
-              <a:tabLst/>
-            </a:pPr>
-            <a:r>
-              <a:rPr lang="en-US" dirty="0"/>
-              <a:t>15,00%</a:t>
-            </a:r>
-            <a:endParaRPr kumimoji="0" lang="en-DE" sz="2400" b="0" i="0" u="none" strike="noStrike" cap="none" spc="0" normalizeH="0" baseline="0" dirty="0">
-              <a:ln>
-                <a:noFill/>
-              </a:ln>
-              <a:solidFill>
-                <a:srgbClr val="5E5E5E"/>
-              </a:solidFill>
-              <a:effectLst/>
-              <a:uFillTx/>
-              <a:latin typeface="+mn-lt"/>
-              <a:ea typeface="+mn-ea"/>
-              <a:cs typeface="+mn-cs"/>
-              <a:sym typeface="Helvetica Neue"/>
-            </a:endParaRPr>
-          </a:p>
-        </p:txBody>
-      </p:sp>
-      <p:sp>
-        <p:nvSpPr>
-          <p:cNvPr id="11" name="Textfeld 10">
-            <a:extLst>
-              <a:ext uri="{FF2B5EF4-FFF2-40B4-BE49-F238E27FC236}">
-                <a16:creationId xmlns:a16="http://schemas.microsoft.com/office/drawing/2014/main" id="{AAFE19DC-0678-4613-A668-2ECEF4992AC6}"/>
-              </a:ext>
-            </a:extLst>
-          </p:cNvPr>
-          <p:cNvSpPr txBox="1"/>
-          <p:nvPr/>
-        </p:nvSpPr>
-        <p:spPr>
-          <a:xfrm>
-            <a:off x="6707648" y="3321988"/>
-            <a:ext cx="1219673" cy="841256"/>
-          </a:xfrm>
-          <a:prstGeom prst="rect">
-            <a:avLst/>
-          </a:prstGeom>
-          <a:noFill/>
-          <a:ln w="12700" cap="flat">
-            <a:noFill/>
-            <a:miter lim="400000"/>
-          </a:ln>
-          <a:effectLst/>
-          <a:sp3d/>
-        </p:spPr>
-        <p:style>
-          <a:lnRef idx="0">
-            <a:scrgbClr r="0" g="0" b="0"/>
-          </a:lnRef>
-          <a:fillRef idx="0">
-            <a:scrgbClr r="0" g="0" b="0"/>
-          </a:fillRef>
-          <a:effectRef idx="0">
-            <a:scrgbClr r="0" g="0" b="0"/>
-          </a:effectRef>
-          <a:fontRef idx="none"/>
-        </p:style>
-        <p:txBody>
-          <a:bodyPr rot="0" spcFirstLastPara="1" vertOverflow="overflow" horzOverflow="overflow" vert="horz" wrap="square" lIns="50800" tIns="50800" rIns="50800" bIns="50800" numCol="1" spcCol="38100" rtlCol="0" anchor="ctr">
-            <a:spAutoFit/>
-          </a:bodyPr>
-          <a:lstStyle/>
-          <a:p>
-            <a:pPr marL="0" marR="0" indent="0" algn="ctr" defTabSz="2438338" rtl="0" fontAlgn="auto" latinLnBrk="0" hangingPunct="0">
-              <a:lnSpc>
-                <a:spcPct val="100000"/>
-              </a:lnSpc>
-              <a:spcBef>
-                <a:spcPts val="0"/>
-              </a:spcBef>
-              <a:spcAft>
-                <a:spcPts val="0"/>
-              </a:spcAft>
-              <a:buClrTx/>
-              <a:buSzTx/>
-              <a:buFontTx/>
-              <a:buNone/>
-              <a:tabLst/>
-            </a:pPr>
-            <a:r>
-              <a:rPr kumimoji="0" lang="en-US" sz="2400" b="0" i="0" u="none" strike="noStrike" cap="none" spc="0" normalizeH="0" baseline="0" dirty="0">
-                <a:ln>
-                  <a:noFill/>
-                </a:ln>
-                <a:solidFill>
-                  <a:srgbClr val="5E5E5E"/>
-                </a:solidFill>
-                <a:effectLst/>
-                <a:uFillTx/>
-                <a:latin typeface="+mn-lt"/>
-                <a:ea typeface="+mn-ea"/>
-                <a:cs typeface="+mn-cs"/>
-                <a:sym typeface="Helvetica Neue"/>
-              </a:rPr>
-              <a:t>UK</a:t>
-            </a:r>
-          </a:p>
-          <a:p>
-            <a:pPr marL="0" marR="0" indent="0" algn="ctr" defTabSz="2438338" rtl="0" fontAlgn="auto" latinLnBrk="0" hangingPunct="0">
-              <a:lnSpc>
-                <a:spcPct val="100000"/>
-              </a:lnSpc>
-              <a:spcBef>
-                <a:spcPts val="0"/>
-              </a:spcBef>
-              <a:spcAft>
-                <a:spcPts val="0"/>
-              </a:spcAft>
-              <a:buClrTx/>
-              <a:buSzTx/>
-              <a:buFontTx/>
-              <a:buNone/>
-              <a:tabLst/>
-            </a:pPr>
-            <a:r>
-              <a:rPr lang="en-US" dirty="0"/>
-              <a:t>14,77%</a:t>
-            </a:r>
-            <a:endParaRPr kumimoji="0" lang="en-DE" sz="2400" b="0" i="0" u="none" strike="noStrike" cap="none" spc="0" normalizeH="0" baseline="0" dirty="0">
-              <a:ln>
-                <a:noFill/>
-              </a:ln>
-              <a:solidFill>
-                <a:srgbClr val="5E5E5E"/>
-              </a:solidFill>
-              <a:effectLst/>
-              <a:uFillTx/>
-              <a:latin typeface="+mn-lt"/>
-              <a:ea typeface="+mn-ea"/>
-              <a:cs typeface="+mn-cs"/>
-              <a:sym typeface="Helvetica Neue"/>
-            </a:endParaRPr>
-          </a:p>
-        </p:txBody>
-      </p:sp>
-      <p:sp>
-        <p:nvSpPr>
-          <p:cNvPr id="12" name="Textfeld 11">
-            <a:extLst>
-              <a:ext uri="{FF2B5EF4-FFF2-40B4-BE49-F238E27FC236}">
-                <a16:creationId xmlns:a16="http://schemas.microsoft.com/office/drawing/2014/main" id="{9FCA2DC9-CEAC-42FD-A505-6DB7CBAD4A17}"/>
-              </a:ext>
-            </a:extLst>
-          </p:cNvPr>
-          <p:cNvSpPr txBox="1"/>
-          <p:nvPr/>
-        </p:nvSpPr>
-        <p:spPr>
-          <a:xfrm>
-            <a:off x="7927321" y="3305722"/>
-            <a:ext cx="1219673" cy="841256"/>
-          </a:xfrm>
-          <a:prstGeom prst="rect">
-            <a:avLst/>
-          </a:prstGeom>
-          <a:noFill/>
-          <a:ln w="12700" cap="flat">
-            <a:noFill/>
-            <a:miter lim="400000"/>
-          </a:ln>
-          <a:effectLst/>
-          <a:sp3d/>
-        </p:spPr>
-        <p:style>
-          <a:lnRef idx="0">
-            <a:scrgbClr r="0" g="0" b="0"/>
-          </a:lnRef>
-          <a:fillRef idx="0">
-            <a:scrgbClr r="0" g="0" b="0"/>
-          </a:fillRef>
-          <a:effectRef idx="0">
-            <a:scrgbClr r="0" g="0" b="0"/>
-          </a:effectRef>
-          <a:fontRef idx="none"/>
-        </p:style>
-        <p:txBody>
-          <a:bodyPr rot="0" spcFirstLastPara="1" vertOverflow="overflow" horzOverflow="overflow" vert="horz" wrap="square" lIns="50800" tIns="50800" rIns="50800" bIns="50800" numCol="1" spcCol="38100" rtlCol="0" anchor="ctr">
-            <a:spAutoFit/>
-          </a:bodyPr>
-          <a:lstStyle/>
-          <a:p>
-            <a:pPr marL="0" marR="0" indent="0" algn="ctr" defTabSz="2438338" rtl="0" fontAlgn="auto" latinLnBrk="0" hangingPunct="0">
-              <a:lnSpc>
-                <a:spcPct val="100000"/>
-              </a:lnSpc>
-              <a:spcBef>
-                <a:spcPts val="0"/>
-              </a:spcBef>
-              <a:spcAft>
-                <a:spcPts val="0"/>
-              </a:spcAft>
-              <a:buClrTx/>
-              <a:buSzTx/>
-              <a:buFontTx/>
-              <a:buNone/>
-              <a:tabLst/>
-            </a:pPr>
-            <a:r>
-              <a:rPr kumimoji="0" lang="en-US" sz="2400" b="0" i="0" u="none" strike="noStrike" cap="none" spc="0" normalizeH="0" baseline="0" dirty="0">
-                <a:ln>
-                  <a:noFill/>
-                </a:ln>
-                <a:solidFill>
-                  <a:srgbClr val="5E5E5E"/>
-                </a:solidFill>
-                <a:effectLst/>
-                <a:uFillTx/>
-                <a:latin typeface="+mn-lt"/>
-                <a:ea typeface="+mn-ea"/>
-                <a:cs typeface="+mn-cs"/>
-                <a:sym typeface="Helvetica Neue"/>
-              </a:rPr>
-              <a:t>US</a:t>
-            </a:r>
-          </a:p>
-          <a:p>
-            <a:pPr marL="0" marR="0" indent="0" algn="ctr" defTabSz="2438338" rtl="0" fontAlgn="auto" latinLnBrk="0" hangingPunct="0">
-              <a:lnSpc>
-                <a:spcPct val="100000"/>
-              </a:lnSpc>
-              <a:spcBef>
-                <a:spcPts val="0"/>
-              </a:spcBef>
-              <a:spcAft>
-                <a:spcPts val="0"/>
-              </a:spcAft>
-              <a:buClrTx/>
-              <a:buSzTx/>
-              <a:buFontTx/>
-              <a:buNone/>
-              <a:tabLst/>
-            </a:pPr>
-            <a:r>
-              <a:rPr lang="en-US" dirty="0"/>
-              <a:t>13,18%</a:t>
-            </a:r>
-            <a:endParaRPr kumimoji="0" lang="en-DE" sz="2400" b="0" i="0" u="none" strike="noStrike" cap="none" spc="0" normalizeH="0" baseline="0" dirty="0">
-              <a:ln>
-                <a:noFill/>
-              </a:ln>
-              <a:solidFill>
-                <a:srgbClr val="5E5E5E"/>
-              </a:solidFill>
-              <a:effectLst/>
-              <a:uFillTx/>
-              <a:latin typeface="+mn-lt"/>
-              <a:ea typeface="+mn-ea"/>
-              <a:cs typeface="+mn-cs"/>
-              <a:sym typeface="Helvetica Neue"/>
-            </a:endParaRPr>
           </a:p>
         </p:txBody>
       </p:sp>

</xml_diff>